<commit_message>
Modified PowerPoint BackGroundStyle and Added ExcelFiles
</commit_message>
<xml_diff>
--- a/PowerPoint/report_hokada.pptx
+++ b/PowerPoint/report_hokada.pptx
@@ -20424,6 +20424,2028 @@
           <a:chExt cx="0" cy="0"/>
         </a:xfrm>
       </p:grpSpPr>
+      <p:grpSp>
+        <p:nvGrpSpPr>
+          <p:cNvPr id="29" name="Shape 7"/>
+          <p:cNvGrpSpPr/>
+          <p:nvPr userDrawn="1"/>
+        </p:nvGrpSpPr>
+        <p:grpSpPr>
+          <a:xfrm>
+            <a:off x="0" y="0"/>
+            <a:ext cx="9144000" cy="6957392"/>
+            <a:chOff x="0" y="0"/>
+            <a:chExt cx="9144000" cy="6858000"/>
+          </a:xfrm>
+        </p:grpSpPr>
+        <p:sp>
+          <p:nvSpPr>
+            <p:cNvPr id="30" name="Shape 8"/>
+            <p:cNvSpPr/>
+            <p:nvPr/>
+          </p:nvSpPr>
+          <p:spPr>
+            <a:xfrm>
+              <a:off x="0" y="0"/>
+              <a:ext cx="9144000" cy="6858000"/>
+            </a:xfrm>
+            <a:prstGeom prst="rect">
+              <a:avLst/>
+            </a:prstGeom>
+            <a:solidFill>
+              <a:schemeClr val="lt1"/>
+            </a:solidFill>
+            <a:ln>
+              <a:noFill/>
+            </a:ln>
+          </p:spPr>
+          <p:txBody>
+            <a:bodyPr lIns="91425" tIns="45700" rIns="91425" bIns="45700" anchor="ctr" anchorCtr="0">
+              <a:noAutofit/>
+            </a:bodyPr>
+            <a:lstStyle/>
+            <a:p>
+              <a:pPr marL="0" marR="0" lvl="0" indent="0" algn="ctr" rtl="0">
+                <a:spcBef>
+                  <a:spcPts val="0"/>
+                </a:spcBef>
+                <a:buNone/>
+              </a:pPr>
+              <a:endParaRPr sz="1800" b="0" i="0" u="none" strike="noStrike" cap="none" baseline="0">
+                <a:solidFill>
+                  <a:schemeClr val="lt1"/>
+                </a:solidFill>
+                <a:latin typeface="Calibri"/>
+                <a:ea typeface="Calibri"/>
+                <a:cs typeface="Calibri"/>
+                <a:sym typeface="Calibri"/>
+              </a:endParaRPr>
+            </a:p>
+          </p:txBody>
+        </p:sp>
+        <p:sp>
+          <p:nvSpPr>
+            <p:cNvPr id="31" name="Shape 9"/>
+            <p:cNvSpPr/>
+            <p:nvPr/>
+          </p:nvSpPr>
+          <p:spPr>
+            <a:xfrm>
+              <a:off x="7543798" y="0"/>
+              <a:ext cx="1600202" cy="2209799"/>
+            </a:xfrm>
+            <a:custGeom>
+              <a:avLst/>
+              <a:gdLst/>
+              <a:ahLst/>
+              <a:cxnLst/>
+              <a:rect l="0" t="0" r="0" b="0"/>
+              <a:pathLst>
+                <a:path w="1432" h="3492" extrusionOk="0">
+                  <a:moveTo>
+                    <a:pt x="0" y="0"/>
+                  </a:moveTo>
+                  <a:lnTo>
+                    <a:pt x="1432" y="0"/>
+                  </a:lnTo>
+                  <a:lnTo>
+                    <a:pt x="1432" y="3492"/>
+                  </a:lnTo>
+                  <a:lnTo>
+                    <a:pt x="1419" y="3252"/>
+                  </a:lnTo>
+                  <a:lnTo>
+                    <a:pt x="1406" y="3024"/>
+                  </a:lnTo>
+                  <a:lnTo>
+                    <a:pt x="1393" y="2807"/>
+                  </a:lnTo>
+                  <a:lnTo>
+                    <a:pt x="1379" y="2601"/>
+                  </a:lnTo>
+                  <a:lnTo>
+                    <a:pt x="1364" y="2407"/>
+                  </a:lnTo>
+                  <a:lnTo>
+                    <a:pt x="1348" y="2222"/>
+                  </a:lnTo>
+                  <a:lnTo>
+                    <a:pt x="1330" y="2047"/>
+                  </a:lnTo>
+                  <a:lnTo>
+                    <a:pt x="1311" y="1881"/>
+                  </a:lnTo>
+                  <a:lnTo>
+                    <a:pt x="1291" y="1726"/>
+                  </a:lnTo>
+                  <a:lnTo>
+                    <a:pt x="1268" y="1580"/>
+                  </a:lnTo>
+                  <a:lnTo>
+                    <a:pt x="1245" y="1442"/>
+                  </a:lnTo>
+                  <a:lnTo>
+                    <a:pt x="1218" y="1313"/>
+                  </a:lnTo>
+                  <a:lnTo>
+                    <a:pt x="1190" y="1192"/>
+                  </a:lnTo>
+                  <a:lnTo>
+                    <a:pt x="1158" y="1078"/>
+                  </a:lnTo>
+                  <a:lnTo>
+                    <a:pt x="1125" y="973"/>
+                  </a:lnTo>
+                  <a:lnTo>
+                    <a:pt x="1089" y="873"/>
+                  </a:lnTo>
+                  <a:lnTo>
+                    <a:pt x="1049" y="781"/>
+                  </a:lnTo>
+                  <a:lnTo>
+                    <a:pt x="1007" y="696"/>
+                  </a:lnTo>
+                  <a:lnTo>
+                    <a:pt x="962" y="617"/>
+                  </a:lnTo>
+                  <a:lnTo>
+                    <a:pt x="913" y="544"/>
+                  </a:lnTo>
+                  <a:lnTo>
+                    <a:pt x="860" y="475"/>
+                  </a:lnTo>
+                  <a:lnTo>
+                    <a:pt x="804" y="413"/>
+                  </a:lnTo>
+                  <a:lnTo>
+                    <a:pt x="744" y="354"/>
+                  </a:lnTo>
+                  <a:lnTo>
+                    <a:pt x="680" y="301"/>
+                  </a:lnTo>
+                  <a:lnTo>
+                    <a:pt x="611" y="252"/>
+                  </a:lnTo>
+                  <a:lnTo>
+                    <a:pt x="539" y="206"/>
+                  </a:lnTo>
+                  <a:lnTo>
+                    <a:pt x="461" y="165"/>
+                  </a:lnTo>
+                  <a:lnTo>
+                    <a:pt x="379" y="128"/>
+                  </a:lnTo>
+                  <a:lnTo>
+                    <a:pt x="292" y="92"/>
+                  </a:lnTo>
+                  <a:lnTo>
+                    <a:pt x="200" y="59"/>
+                  </a:lnTo>
+                  <a:lnTo>
+                    <a:pt x="103" y="28"/>
+                  </a:lnTo>
+                  <a:lnTo>
+                    <a:pt x="0" y="0"/>
+                  </a:lnTo>
+                  <a:close/>
+                </a:path>
+              </a:pathLst>
+            </a:custGeom>
+            <a:solidFill>
+              <a:srgbClr val="47D147"/>
+            </a:solidFill>
+            <a:ln>
+              <a:noFill/>
+            </a:ln>
+          </p:spPr>
+          <p:txBody>
+            <a:bodyPr lIns="91425" tIns="45700" rIns="91425" bIns="45700" anchor="t" anchorCtr="0">
+              <a:noAutofit/>
+            </a:bodyPr>
+            <a:lstStyle/>
+            <a:p>
+              <a:pPr marL="0" marR="0" lvl="0" indent="0" algn="l" rtl="0">
+                <a:spcBef>
+                  <a:spcPts val="0"/>
+                </a:spcBef>
+                <a:buNone/>
+              </a:pPr>
+              <a:endParaRPr sz="1800" b="0" i="0" u="none" strike="noStrike" cap="none" baseline="0">
+                <a:solidFill>
+                  <a:schemeClr val="dk1"/>
+                </a:solidFill>
+                <a:latin typeface="Calibri"/>
+                <a:ea typeface="Calibri"/>
+                <a:cs typeface="Calibri"/>
+                <a:sym typeface="Calibri"/>
+              </a:endParaRPr>
+            </a:p>
+          </p:txBody>
+        </p:sp>
+        <p:sp>
+          <p:nvSpPr>
+            <p:cNvPr id="32" name="Shape 10"/>
+            <p:cNvSpPr/>
+            <p:nvPr/>
+          </p:nvSpPr>
+          <p:spPr>
+            <a:xfrm>
+              <a:off x="5652120" y="6317158"/>
+              <a:ext cx="3384376" cy="442870"/>
+            </a:xfrm>
+            <a:custGeom>
+              <a:avLst/>
+              <a:gdLst/>
+              <a:ahLst/>
+              <a:cxnLst/>
+              <a:rect l="0" t="0" r="0" b="0"/>
+              <a:pathLst>
+                <a:path w="17264" h="2710" extrusionOk="0">
+                  <a:moveTo>
+                    <a:pt x="17264" y="0"/>
+                  </a:moveTo>
+                  <a:lnTo>
+                    <a:pt x="17264" y="180"/>
+                  </a:lnTo>
+                  <a:lnTo>
+                    <a:pt x="17010" y="442"/>
+                  </a:lnTo>
+                  <a:lnTo>
+                    <a:pt x="16706" y="689"/>
+                  </a:lnTo>
+                  <a:lnTo>
+                    <a:pt x="16354" y="923"/>
+                  </a:lnTo>
+                  <a:lnTo>
+                    <a:pt x="15959" y="1141"/>
+                  </a:lnTo>
+                  <a:lnTo>
+                    <a:pt x="15524" y="1345"/>
+                  </a:lnTo>
+                  <a:lnTo>
+                    <a:pt x="15050" y="1535"/>
+                  </a:lnTo>
+                  <a:lnTo>
+                    <a:pt x="14543" y="1710"/>
+                  </a:lnTo>
+                  <a:lnTo>
+                    <a:pt x="14003" y="1871"/>
+                  </a:lnTo>
+                  <a:lnTo>
+                    <a:pt x="13437" y="2018"/>
+                  </a:lnTo>
+                  <a:lnTo>
+                    <a:pt x="12844" y="2151"/>
+                  </a:lnTo>
+                  <a:lnTo>
+                    <a:pt x="12232" y="2269"/>
+                  </a:lnTo>
+                  <a:lnTo>
+                    <a:pt x="11599" y="2374"/>
+                  </a:lnTo>
+                  <a:lnTo>
+                    <a:pt x="10952" y="2464"/>
+                  </a:lnTo>
+                  <a:lnTo>
+                    <a:pt x="10294" y="2540"/>
+                  </a:lnTo>
+                  <a:lnTo>
+                    <a:pt x="9625" y="2602"/>
+                  </a:lnTo>
+                  <a:lnTo>
+                    <a:pt x="8951" y="2649"/>
+                  </a:lnTo>
+                  <a:lnTo>
+                    <a:pt x="8275" y="2684"/>
+                  </a:lnTo>
+                  <a:lnTo>
+                    <a:pt x="7599" y="2704"/>
+                  </a:lnTo>
+                  <a:lnTo>
+                    <a:pt x="6928" y="2710"/>
+                  </a:lnTo>
+                  <a:lnTo>
+                    <a:pt x="6264" y="2702"/>
+                  </a:lnTo>
+                  <a:lnTo>
+                    <a:pt x="5609" y="2681"/>
+                  </a:lnTo>
+                  <a:lnTo>
+                    <a:pt x="4968" y="2645"/>
+                  </a:lnTo>
+                  <a:lnTo>
+                    <a:pt x="4344" y="2597"/>
+                  </a:lnTo>
+                  <a:lnTo>
+                    <a:pt x="3740" y="2534"/>
+                  </a:lnTo>
+                  <a:lnTo>
+                    <a:pt x="3158" y="2457"/>
+                  </a:lnTo>
+                  <a:lnTo>
+                    <a:pt x="2603" y="2367"/>
+                  </a:lnTo>
+                  <a:lnTo>
+                    <a:pt x="2077" y="2264"/>
+                  </a:lnTo>
+                  <a:lnTo>
+                    <a:pt x="1584" y="2147"/>
+                  </a:lnTo>
+                  <a:lnTo>
+                    <a:pt x="1126" y="2016"/>
+                  </a:lnTo>
+                  <a:lnTo>
+                    <a:pt x="708" y="1871"/>
+                  </a:lnTo>
+                  <a:lnTo>
+                    <a:pt x="331" y="1714"/>
+                  </a:lnTo>
+                  <a:lnTo>
+                    <a:pt x="0" y="1543"/>
+                  </a:lnTo>
+                  <a:lnTo>
+                    <a:pt x="0" y="1474"/>
+                  </a:lnTo>
+                  <a:lnTo>
+                    <a:pt x="341" y="1635"/>
+                  </a:lnTo>
+                  <a:lnTo>
+                    <a:pt x="727" y="1784"/>
+                  </a:lnTo>
+                  <a:lnTo>
+                    <a:pt x="1155" y="1920"/>
+                  </a:lnTo>
+                  <a:lnTo>
+                    <a:pt x="1621" y="2042"/>
+                  </a:lnTo>
+                  <a:lnTo>
+                    <a:pt x="2121" y="2151"/>
+                  </a:lnTo>
+                  <a:lnTo>
+                    <a:pt x="2654" y="2249"/>
+                  </a:lnTo>
+                  <a:lnTo>
+                    <a:pt x="3215" y="2331"/>
+                  </a:lnTo>
+                  <a:lnTo>
+                    <a:pt x="3803" y="2401"/>
+                  </a:lnTo>
+                  <a:lnTo>
+                    <a:pt x="4413" y="2457"/>
+                  </a:lnTo>
+                  <a:lnTo>
+                    <a:pt x="5041" y="2500"/>
+                  </a:lnTo>
+                  <a:lnTo>
+                    <a:pt x="5686" y="2531"/>
+                  </a:lnTo>
+                  <a:lnTo>
+                    <a:pt x="6343" y="2547"/>
+                  </a:lnTo>
+                  <a:lnTo>
+                    <a:pt x="7011" y="2550"/>
+                  </a:lnTo>
+                  <a:lnTo>
+                    <a:pt x="7685" y="2539"/>
+                  </a:lnTo>
+                  <a:lnTo>
+                    <a:pt x="8361" y="2515"/>
+                  </a:lnTo>
+                  <a:lnTo>
+                    <a:pt x="9039" y="2478"/>
+                  </a:lnTo>
+                  <a:lnTo>
+                    <a:pt x="9712" y="2426"/>
+                  </a:lnTo>
+                  <a:lnTo>
+                    <a:pt x="10379" y="2361"/>
+                  </a:lnTo>
+                  <a:lnTo>
+                    <a:pt x="11037" y="2283"/>
+                  </a:lnTo>
+                  <a:lnTo>
+                    <a:pt x="11682" y="2190"/>
+                  </a:lnTo>
+                  <a:lnTo>
+                    <a:pt x="12311" y="2084"/>
+                  </a:lnTo>
+                  <a:lnTo>
+                    <a:pt x="12921" y="1964"/>
+                  </a:lnTo>
+                  <a:lnTo>
+                    <a:pt x="13509" y="1831"/>
+                  </a:lnTo>
+                  <a:lnTo>
+                    <a:pt x="14070" y="1683"/>
+                  </a:lnTo>
+                  <a:lnTo>
+                    <a:pt x="14604" y="1522"/>
+                  </a:lnTo>
+                  <a:lnTo>
+                    <a:pt x="15105" y="1347"/>
+                  </a:lnTo>
+                  <a:lnTo>
+                    <a:pt x="15571" y="1158"/>
+                  </a:lnTo>
+                  <a:lnTo>
+                    <a:pt x="15999" y="954"/>
+                  </a:lnTo>
+                  <a:lnTo>
+                    <a:pt x="16386" y="737"/>
+                  </a:lnTo>
+                  <a:lnTo>
+                    <a:pt x="16728" y="506"/>
+                  </a:lnTo>
+                  <a:lnTo>
+                    <a:pt x="17021" y="260"/>
+                  </a:lnTo>
+                  <a:lnTo>
+                    <a:pt x="17264" y="0"/>
+                  </a:lnTo>
+                  <a:close/>
+                </a:path>
+              </a:pathLst>
+            </a:custGeom>
+            <a:solidFill>
+              <a:srgbClr val="47D147"/>
+            </a:solidFill>
+            <a:ln>
+              <a:noFill/>
+            </a:ln>
+          </p:spPr>
+          <p:txBody>
+            <a:bodyPr lIns="91425" tIns="45700" rIns="91425" bIns="45700" anchor="t" anchorCtr="0">
+              <a:noAutofit/>
+            </a:bodyPr>
+            <a:lstStyle/>
+            <a:p>
+              <a:pPr marL="0" marR="0" lvl="0" indent="0" algn="l" rtl="0">
+                <a:spcBef>
+                  <a:spcPts val="0"/>
+                </a:spcBef>
+                <a:buNone/>
+              </a:pPr>
+              <a:endParaRPr sz="1800" b="0" i="0" u="none" strike="noStrike" cap="none" baseline="0">
+                <a:solidFill>
+                  <a:schemeClr val="dk1"/>
+                </a:solidFill>
+                <a:latin typeface="Calibri"/>
+                <a:ea typeface="Calibri"/>
+                <a:cs typeface="Calibri"/>
+                <a:sym typeface="Calibri"/>
+              </a:endParaRPr>
+            </a:p>
+          </p:txBody>
+        </p:sp>
+      </p:grpSp>
+      <p:grpSp>
+        <p:nvGrpSpPr>
+          <p:cNvPr id="19" name="Shape 12"/>
+          <p:cNvGrpSpPr/>
+          <p:nvPr userDrawn="1"/>
+        </p:nvGrpSpPr>
+        <p:grpSpPr>
+          <a:xfrm>
+            <a:off x="-1" y="2141264"/>
+            <a:ext cx="5626745" cy="4716736"/>
+            <a:chOff x="0" y="2533588"/>
+            <a:chExt cx="8022335" cy="8966518"/>
+          </a:xfrm>
+        </p:grpSpPr>
+        <p:sp>
+          <p:nvSpPr>
+            <p:cNvPr id="20" name="Shape 13"/>
+            <p:cNvSpPr/>
+            <p:nvPr/>
+          </p:nvSpPr>
+          <p:spPr>
+            <a:xfrm>
+              <a:off x="0" y="2533588"/>
+              <a:ext cx="4127500" cy="2514597"/>
+            </a:xfrm>
+            <a:custGeom>
+              <a:avLst/>
+              <a:gdLst/>
+              <a:ahLst/>
+              <a:cxnLst/>
+              <a:rect l="0" t="0" r="0" b="0"/>
+              <a:pathLst>
+                <a:path w="2600" h="1587" extrusionOk="0">
+                  <a:moveTo>
+                    <a:pt x="0" y="0"/>
+                  </a:moveTo>
+                  <a:lnTo>
+                    <a:pt x="0" y="0"/>
+                  </a:lnTo>
+                  <a:lnTo>
+                    <a:pt x="63" y="8"/>
+                  </a:lnTo>
+                  <a:lnTo>
+                    <a:pt x="124" y="18"/>
+                  </a:lnTo>
+                  <a:lnTo>
+                    <a:pt x="185" y="28"/>
+                  </a:lnTo>
+                  <a:lnTo>
+                    <a:pt x="246" y="40"/>
+                  </a:lnTo>
+                  <a:lnTo>
+                    <a:pt x="305" y="53"/>
+                  </a:lnTo>
+                  <a:lnTo>
+                    <a:pt x="365" y="64"/>
+                  </a:lnTo>
+                  <a:lnTo>
+                    <a:pt x="480" y="94"/>
+                  </a:lnTo>
+                  <a:lnTo>
+                    <a:pt x="596" y="127"/>
+                  </a:lnTo>
+                  <a:lnTo>
+                    <a:pt x="706" y="162"/>
+                  </a:lnTo>
+                  <a:lnTo>
+                    <a:pt x="815" y="200"/>
+                  </a:lnTo>
+                  <a:lnTo>
+                    <a:pt x="921" y="241"/>
+                  </a:lnTo>
+                  <a:lnTo>
+                    <a:pt x="1025" y="286"/>
+                  </a:lnTo>
+                  <a:lnTo>
+                    <a:pt x="1126" y="330"/>
+                  </a:lnTo>
+                  <a:lnTo>
+                    <a:pt x="1223" y="380"/>
+                  </a:lnTo>
+                  <a:lnTo>
+                    <a:pt x="1319" y="429"/>
+                  </a:lnTo>
+                  <a:lnTo>
+                    <a:pt x="1411" y="482"/>
+                  </a:lnTo>
+                  <a:lnTo>
+                    <a:pt x="1502" y="537"/>
+                  </a:lnTo>
+                  <a:lnTo>
+                    <a:pt x="1588" y="591"/>
+                  </a:lnTo>
+                  <a:lnTo>
+                    <a:pt x="1672" y="649"/>
+                  </a:lnTo>
+                  <a:lnTo>
+                    <a:pt x="1753" y="707"/>
+                  </a:lnTo>
+                  <a:lnTo>
+                    <a:pt x="1831" y="764"/>
+                  </a:lnTo>
+                  <a:lnTo>
+                    <a:pt x="1907" y="824"/>
+                  </a:lnTo>
+                  <a:lnTo>
+                    <a:pt x="1979" y="885"/>
+                  </a:lnTo>
+                  <a:lnTo>
+                    <a:pt x="2047" y="946"/>
+                  </a:lnTo>
+                  <a:lnTo>
+                    <a:pt x="2113" y="1005"/>
+                  </a:lnTo>
+                  <a:lnTo>
+                    <a:pt x="2177" y="1066"/>
+                  </a:lnTo>
+                  <a:lnTo>
+                    <a:pt x="2237" y="1128"/>
+                  </a:lnTo>
+                  <a:lnTo>
+                    <a:pt x="2293" y="1189"/>
+                  </a:lnTo>
+                  <a:lnTo>
+                    <a:pt x="2347" y="1248"/>
+                  </a:lnTo>
+                  <a:lnTo>
+                    <a:pt x="2397" y="1308"/>
+                  </a:lnTo>
+                  <a:lnTo>
+                    <a:pt x="2445" y="1365"/>
+                  </a:lnTo>
+                  <a:lnTo>
+                    <a:pt x="2488" y="1423"/>
+                  </a:lnTo>
+                  <a:lnTo>
+                    <a:pt x="2529" y="1479"/>
+                  </a:lnTo>
+                  <a:lnTo>
+                    <a:pt x="2565" y="1534"/>
+                  </a:lnTo>
+                  <a:lnTo>
+                    <a:pt x="2600" y="1587"/>
+                  </a:lnTo>
+                  <a:lnTo>
+                    <a:pt x="2600" y="1587"/>
+                  </a:lnTo>
+                  <a:lnTo>
+                    <a:pt x="2570" y="1555"/>
+                  </a:lnTo>
+                  <a:lnTo>
+                    <a:pt x="2535" y="1522"/>
+                  </a:lnTo>
+                  <a:lnTo>
+                    <a:pt x="2497" y="1487"/>
+                  </a:lnTo>
+                  <a:lnTo>
+                    <a:pt x="2455" y="1451"/>
+                  </a:lnTo>
+                  <a:lnTo>
+                    <a:pt x="2408" y="1413"/>
+                  </a:lnTo>
+                  <a:lnTo>
+                    <a:pt x="2359" y="1375"/>
+                  </a:lnTo>
+                  <a:lnTo>
+                    <a:pt x="2304" y="1336"/>
+                  </a:lnTo>
+                  <a:lnTo>
+                    <a:pt x="2247" y="1294"/>
+                  </a:lnTo>
+                  <a:lnTo>
+                    <a:pt x="2185" y="1255"/>
+                  </a:lnTo>
+                  <a:lnTo>
+                    <a:pt x="2119" y="1215"/>
+                  </a:lnTo>
+                  <a:lnTo>
+                    <a:pt x="2052" y="1174"/>
+                  </a:lnTo>
+                  <a:lnTo>
+                    <a:pt x="1981" y="1134"/>
+                  </a:lnTo>
+                  <a:lnTo>
+                    <a:pt x="1905" y="1096"/>
+                  </a:lnTo>
+                  <a:lnTo>
+                    <a:pt x="1827" y="1058"/>
+                  </a:lnTo>
+                  <a:lnTo>
+                    <a:pt x="1746" y="1020"/>
+                  </a:lnTo>
+                  <a:lnTo>
+                    <a:pt x="1662" y="986"/>
+                  </a:lnTo>
+                  <a:lnTo>
+                    <a:pt x="1576" y="953"/>
+                  </a:lnTo>
+                  <a:lnTo>
+                    <a:pt x="1486" y="921"/>
+                  </a:lnTo>
+                  <a:lnTo>
+                    <a:pt x="1393" y="891"/>
+                  </a:lnTo>
+                  <a:lnTo>
+                    <a:pt x="1299" y="865"/>
+                  </a:lnTo>
+                  <a:lnTo>
+                    <a:pt x="1202" y="840"/>
+                  </a:lnTo>
+                  <a:lnTo>
+                    <a:pt x="1103" y="819"/>
+                  </a:lnTo>
+                  <a:lnTo>
+                    <a:pt x="1000" y="801"/>
+                  </a:lnTo>
+                  <a:lnTo>
+                    <a:pt x="896" y="787"/>
+                  </a:lnTo>
+                  <a:lnTo>
+                    <a:pt x="843" y="781"/>
+                  </a:lnTo>
+                  <a:lnTo>
+                    <a:pt x="791" y="776"/>
+                  </a:lnTo>
+                  <a:lnTo>
+                    <a:pt x="738" y="773"/>
+                  </a:lnTo>
+                  <a:lnTo>
+                    <a:pt x="683" y="769"/>
+                  </a:lnTo>
+                  <a:lnTo>
+                    <a:pt x="629" y="768"/>
+                  </a:lnTo>
+                  <a:lnTo>
+                    <a:pt x="573" y="768"/>
+                  </a:lnTo>
+                  <a:lnTo>
+                    <a:pt x="518" y="768"/>
+                  </a:lnTo>
+                  <a:lnTo>
+                    <a:pt x="462" y="769"/>
+                  </a:lnTo>
+                  <a:lnTo>
+                    <a:pt x="406" y="773"/>
+                  </a:lnTo>
+                  <a:lnTo>
+                    <a:pt x="348" y="776"/>
+                  </a:lnTo>
+                  <a:lnTo>
+                    <a:pt x="292" y="781"/>
+                  </a:lnTo>
+                  <a:lnTo>
+                    <a:pt x="234" y="787"/>
+                  </a:lnTo>
+                  <a:lnTo>
+                    <a:pt x="177" y="796"/>
+                  </a:lnTo>
+                  <a:lnTo>
+                    <a:pt x="117" y="806"/>
+                  </a:lnTo>
+                  <a:lnTo>
+                    <a:pt x="59" y="816"/>
+                  </a:lnTo>
+                  <a:lnTo>
+                    <a:pt x="0" y="827"/>
+                  </a:lnTo>
+                  <a:lnTo>
+                    <a:pt x="0" y="0"/>
+                  </a:lnTo>
+                  <a:lnTo>
+                    <a:pt x="0" y="0"/>
+                  </a:lnTo>
+                  <a:close/>
+                </a:path>
+              </a:pathLst>
+            </a:custGeom>
+            <a:solidFill>
+              <a:srgbClr val="D9F5D9"/>
+            </a:solidFill>
+            <a:ln>
+              <a:noFill/>
+            </a:ln>
+          </p:spPr>
+          <p:txBody>
+            <a:bodyPr lIns="91425" tIns="45700" rIns="91425" bIns="45700" anchor="t" anchorCtr="0">
+              <a:noAutofit/>
+            </a:bodyPr>
+            <a:lstStyle/>
+            <a:p>
+              <a:pPr marL="0" marR="0" lvl="0" indent="0" algn="l" rtl="0">
+                <a:spcBef>
+                  <a:spcPts val="0"/>
+                </a:spcBef>
+                <a:buNone/>
+              </a:pPr>
+              <a:endParaRPr sz="1800" b="0" i="0" u="none" strike="noStrike" cap="none" baseline="0">
+                <a:solidFill>
+                  <a:schemeClr val="dk1"/>
+                </a:solidFill>
+                <a:latin typeface="Calibri"/>
+                <a:ea typeface="Calibri"/>
+                <a:cs typeface="Calibri"/>
+                <a:sym typeface="Calibri"/>
+              </a:endParaRPr>
+            </a:p>
+          </p:txBody>
+        </p:sp>
+        <p:sp>
+          <p:nvSpPr>
+            <p:cNvPr id="21" name="Shape 14"/>
+            <p:cNvSpPr/>
+            <p:nvPr/>
+          </p:nvSpPr>
+          <p:spPr>
+            <a:xfrm>
+              <a:off x="0" y="4980432"/>
+              <a:ext cx="3184027" cy="6519673"/>
+            </a:xfrm>
+            <a:custGeom>
+              <a:avLst/>
+              <a:gdLst/>
+              <a:ahLst/>
+              <a:cxnLst/>
+              <a:rect l="0" t="0" r="0" b="0"/>
+              <a:pathLst>
+                <a:path w="857" h="2024" extrusionOk="0">
+                  <a:moveTo>
+                    <a:pt x="0" y="776"/>
+                  </a:moveTo>
+                  <a:lnTo>
+                    <a:pt x="0" y="776"/>
+                  </a:lnTo>
+                  <a:lnTo>
+                    <a:pt x="38" y="703"/>
+                  </a:lnTo>
+                  <a:lnTo>
+                    <a:pt x="78" y="634"/>
+                  </a:lnTo>
+                  <a:lnTo>
+                    <a:pt x="119" y="566"/>
+                  </a:lnTo>
+                  <a:lnTo>
+                    <a:pt x="162" y="502"/>
+                  </a:lnTo>
+                  <a:lnTo>
+                    <a:pt x="208" y="441"/>
+                  </a:lnTo>
+                  <a:lnTo>
+                    <a:pt x="256" y="381"/>
+                  </a:lnTo>
+                  <a:lnTo>
+                    <a:pt x="305" y="327"/>
+                  </a:lnTo>
+                  <a:lnTo>
+                    <a:pt x="330" y="300"/>
+                  </a:lnTo>
+                  <a:lnTo>
+                    <a:pt x="357" y="274"/>
+                  </a:lnTo>
+                  <a:lnTo>
+                    <a:pt x="385" y="249"/>
+                  </a:lnTo>
+                  <a:lnTo>
+                    <a:pt x="411" y="226"/>
+                  </a:lnTo>
+                  <a:lnTo>
+                    <a:pt x="439" y="203"/>
+                  </a:lnTo>
+                  <a:lnTo>
+                    <a:pt x="469" y="182"/>
+                  </a:lnTo>
+                  <a:lnTo>
+                    <a:pt x="497" y="160"/>
+                  </a:lnTo>
+                  <a:lnTo>
+                    <a:pt x="527" y="140"/>
+                  </a:lnTo>
+                  <a:lnTo>
+                    <a:pt x="558" y="122"/>
+                  </a:lnTo>
+                  <a:lnTo>
+                    <a:pt x="588" y="104"/>
+                  </a:lnTo>
+                  <a:lnTo>
+                    <a:pt x="619" y="87"/>
+                  </a:lnTo>
+                  <a:lnTo>
+                    <a:pt x="652" y="71"/>
+                  </a:lnTo>
+                  <a:lnTo>
+                    <a:pt x="685" y="56"/>
+                  </a:lnTo>
+                  <a:lnTo>
+                    <a:pt x="718" y="43"/>
+                  </a:lnTo>
+                  <a:lnTo>
+                    <a:pt x="751" y="31"/>
+                  </a:lnTo>
+                  <a:lnTo>
+                    <a:pt x="786" y="20"/>
+                  </a:lnTo>
+                  <a:lnTo>
+                    <a:pt x="822" y="10"/>
+                  </a:lnTo>
+                  <a:lnTo>
+                    <a:pt x="857" y="0"/>
+                  </a:lnTo>
+                  <a:lnTo>
+                    <a:pt x="857" y="0"/>
+                  </a:lnTo>
+                  <a:lnTo>
+                    <a:pt x="806" y="46"/>
+                  </a:lnTo>
+                  <a:lnTo>
+                    <a:pt x="754" y="94"/>
+                  </a:lnTo>
+                  <a:lnTo>
+                    <a:pt x="706" y="144"/>
+                  </a:lnTo>
+                  <a:lnTo>
+                    <a:pt x="660" y="196"/>
+                  </a:lnTo>
+                  <a:lnTo>
+                    <a:pt x="617" y="249"/>
+                  </a:lnTo>
+                  <a:lnTo>
+                    <a:pt x="576" y="304"/>
+                  </a:lnTo>
+                  <a:lnTo>
+                    <a:pt x="536" y="362"/>
+                  </a:lnTo>
+                  <a:lnTo>
+                    <a:pt x="498" y="419"/>
+                  </a:lnTo>
+                  <a:lnTo>
+                    <a:pt x="462" y="479"/>
+                  </a:lnTo>
+                  <a:lnTo>
+                    <a:pt x="429" y="538"/>
+                  </a:lnTo>
+                  <a:lnTo>
+                    <a:pt x="398" y="601"/>
+                  </a:lnTo>
+                  <a:lnTo>
+                    <a:pt x="368" y="664"/>
+                  </a:lnTo>
+                  <a:lnTo>
+                    <a:pt x="340" y="728"/>
+                  </a:lnTo>
+                  <a:lnTo>
+                    <a:pt x="315" y="792"/>
+                  </a:lnTo>
+                  <a:lnTo>
+                    <a:pt x="291" y="858"/>
+                  </a:lnTo>
+                  <a:lnTo>
+                    <a:pt x="269" y="925"/>
+                  </a:lnTo>
+                  <a:lnTo>
+                    <a:pt x="249" y="992"/>
+                  </a:lnTo>
+                  <a:lnTo>
+                    <a:pt x="229" y="1060"/>
+                  </a:lnTo>
+                  <a:lnTo>
+                    <a:pt x="213" y="1128"/>
+                  </a:lnTo>
+                  <a:lnTo>
+                    <a:pt x="198" y="1197"/>
+                  </a:lnTo>
+                  <a:lnTo>
+                    <a:pt x="185" y="1266"/>
+                  </a:lnTo>
+                  <a:lnTo>
+                    <a:pt x="173" y="1336"/>
+                  </a:lnTo>
+                  <a:lnTo>
+                    <a:pt x="162" y="1405"/>
+                  </a:lnTo>
+                  <a:lnTo>
+                    <a:pt x="154" y="1474"/>
+                  </a:lnTo>
+                  <a:lnTo>
+                    <a:pt x="147" y="1544"/>
+                  </a:lnTo>
+                  <a:lnTo>
+                    <a:pt x="140" y="1613"/>
+                  </a:lnTo>
+                  <a:lnTo>
+                    <a:pt x="137" y="1682"/>
+                  </a:lnTo>
+                  <a:lnTo>
+                    <a:pt x="134" y="1752"/>
+                  </a:lnTo>
+                  <a:lnTo>
+                    <a:pt x="132" y="1821"/>
+                  </a:lnTo>
+                  <a:lnTo>
+                    <a:pt x="132" y="1889"/>
+                  </a:lnTo>
+                  <a:lnTo>
+                    <a:pt x="134" y="1956"/>
+                  </a:lnTo>
+                  <a:lnTo>
+                    <a:pt x="135" y="2024"/>
+                  </a:lnTo>
+                  <a:lnTo>
+                    <a:pt x="0" y="2024"/>
+                  </a:lnTo>
+                  <a:lnTo>
+                    <a:pt x="0" y="776"/>
+                  </a:lnTo>
+                  <a:lnTo>
+                    <a:pt x="0" y="776"/>
+                  </a:lnTo>
+                  <a:close/>
+                </a:path>
+              </a:pathLst>
+            </a:custGeom>
+            <a:solidFill>
+              <a:srgbClr val="B4ECB4">
+                <a:alpha val="43921"/>
+              </a:srgbClr>
+            </a:solidFill>
+            <a:ln>
+              <a:noFill/>
+            </a:ln>
+          </p:spPr>
+          <p:txBody>
+            <a:bodyPr lIns="91425" tIns="45700" rIns="91425" bIns="45700" anchor="t" anchorCtr="0">
+              <a:noAutofit/>
+            </a:bodyPr>
+            <a:lstStyle/>
+            <a:p>
+              <a:pPr marL="0" marR="0" lvl="0" indent="0" algn="l" rtl="0">
+                <a:spcBef>
+                  <a:spcPts val="0"/>
+                </a:spcBef>
+                <a:buNone/>
+              </a:pPr>
+              <a:endParaRPr sz="1800" b="0" i="0" u="none" strike="noStrike" cap="none" baseline="0">
+                <a:solidFill>
+                  <a:schemeClr val="dk1"/>
+                </a:solidFill>
+                <a:latin typeface="Calibri"/>
+                <a:ea typeface="Calibri"/>
+                <a:cs typeface="Calibri"/>
+                <a:sym typeface="Calibri"/>
+              </a:endParaRPr>
+            </a:p>
+          </p:txBody>
+        </p:sp>
+        <p:sp>
+          <p:nvSpPr>
+            <p:cNvPr id="22" name="Shape 15"/>
+            <p:cNvSpPr/>
+            <p:nvPr/>
+          </p:nvSpPr>
+          <p:spPr>
+            <a:xfrm>
+              <a:off x="0" y="3371787"/>
+              <a:ext cx="2895601" cy="2154237"/>
+            </a:xfrm>
+            <a:custGeom>
+              <a:avLst/>
+              <a:gdLst/>
+              <a:ahLst/>
+              <a:cxnLst/>
+              <a:rect l="0" t="0" r="0" b="0"/>
+              <a:pathLst>
+                <a:path w="1974" h="1357" extrusionOk="0">
+                  <a:moveTo>
+                    <a:pt x="0" y="118"/>
+                  </a:moveTo>
+                  <a:lnTo>
+                    <a:pt x="0" y="118"/>
+                  </a:lnTo>
+                  <a:lnTo>
+                    <a:pt x="83" y="92"/>
+                  </a:lnTo>
+                  <a:lnTo>
+                    <a:pt x="165" y="69"/>
+                  </a:lnTo>
+                  <a:lnTo>
+                    <a:pt x="246" y="49"/>
+                  </a:lnTo>
+                  <a:lnTo>
+                    <a:pt x="327" y="33"/>
+                  </a:lnTo>
+                  <a:lnTo>
+                    <a:pt x="408" y="21"/>
+                  </a:lnTo>
+                  <a:lnTo>
+                    <a:pt x="487" y="11"/>
+                  </a:lnTo>
+                  <a:lnTo>
+                    <a:pt x="566" y="5"/>
+                  </a:lnTo>
+                  <a:lnTo>
+                    <a:pt x="645" y="1"/>
+                  </a:lnTo>
+                  <a:lnTo>
+                    <a:pt x="721" y="0"/>
+                  </a:lnTo>
+                  <a:lnTo>
+                    <a:pt x="797" y="1"/>
+                  </a:lnTo>
+                  <a:lnTo>
+                    <a:pt x="873" y="6"/>
+                  </a:lnTo>
+                  <a:lnTo>
+                    <a:pt x="946" y="13"/>
+                  </a:lnTo>
+                  <a:lnTo>
+                    <a:pt x="1018" y="23"/>
+                  </a:lnTo>
+                  <a:lnTo>
+                    <a:pt x="1088" y="33"/>
+                  </a:lnTo>
+                  <a:lnTo>
+                    <a:pt x="1157" y="47"/>
+                  </a:lnTo>
+                  <a:lnTo>
+                    <a:pt x="1225" y="62"/>
+                  </a:lnTo>
+                  <a:lnTo>
+                    <a:pt x="1289" y="79"/>
+                  </a:lnTo>
+                  <a:lnTo>
+                    <a:pt x="1352" y="97"/>
+                  </a:lnTo>
+                  <a:lnTo>
+                    <a:pt x="1413" y="117"/>
+                  </a:lnTo>
+                  <a:lnTo>
+                    <a:pt x="1472" y="138"/>
+                  </a:lnTo>
+                  <a:lnTo>
+                    <a:pt x="1530" y="161"/>
+                  </a:lnTo>
+                  <a:lnTo>
+                    <a:pt x="1585" y="184"/>
+                  </a:lnTo>
+                  <a:lnTo>
+                    <a:pt x="1636" y="209"/>
+                  </a:lnTo>
+                  <a:lnTo>
+                    <a:pt x="1685" y="236"/>
+                  </a:lnTo>
+                  <a:lnTo>
+                    <a:pt x="1732" y="262"/>
+                  </a:lnTo>
+                  <a:lnTo>
+                    <a:pt x="1776" y="288"/>
+                  </a:lnTo>
+                  <a:lnTo>
+                    <a:pt x="1816" y="315"/>
+                  </a:lnTo>
+                  <a:lnTo>
+                    <a:pt x="1854" y="343"/>
+                  </a:lnTo>
+                  <a:lnTo>
+                    <a:pt x="1888" y="371"/>
+                  </a:lnTo>
+                  <a:lnTo>
+                    <a:pt x="1921" y="399"/>
+                  </a:lnTo>
+                  <a:lnTo>
+                    <a:pt x="1949" y="427"/>
+                  </a:lnTo>
+                  <a:lnTo>
+                    <a:pt x="1974" y="455"/>
+                  </a:lnTo>
+                  <a:lnTo>
+                    <a:pt x="1974" y="455"/>
+                  </a:lnTo>
+                  <a:lnTo>
+                    <a:pt x="1920" y="434"/>
+                  </a:lnTo>
+                  <a:lnTo>
+                    <a:pt x="1864" y="412"/>
+                  </a:lnTo>
+                  <a:lnTo>
+                    <a:pt x="1804" y="394"/>
+                  </a:lnTo>
+                  <a:lnTo>
+                    <a:pt x="1743" y="376"/>
+                  </a:lnTo>
+                  <a:lnTo>
+                    <a:pt x="1680" y="361"/>
+                  </a:lnTo>
+                  <a:lnTo>
+                    <a:pt x="1614" y="348"/>
+                  </a:lnTo>
+                  <a:lnTo>
+                    <a:pt x="1548" y="338"/>
+                  </a:lnTo>
+                  <a:lnTo>
+                    <a:pt x="1481" y="330"/>
+                  </a:lnTo>
+                  <a:lnTo>
+                    <a:pt x="1413" y="323"/>
+                  </a:lnTo>
+                  <a:lnTo>
+                    <a:pt x="1344" y="320"/>
+                  </a:lnTo>
+                  <a:lnTo>
+                    <a:pt x="1273" y="321"/>
+                  </a:lnTo>
+                  <a:lnTo>
+                    <a:pt x="1203" y="325"/>
+                  </a:lnTo>
+                  <a:lnTo>
+                    <a:pt x="1132" y="331"/>
+                  </a:lnTo>
+                  <a:lnTo>
+                    <a:pt x="1061" y="341"/>
+                  </a:lnTo>
+                  <a:lnTo>
+                    <a:pt x="990" y="356"/>
+                  </a:lnTo>
+                  <a:lnTo>
+                    <a:pt x="954" y="364"/>
+                  </a:lnTo>
+                  <a:lnTo>
+                    <a:pt x="919" y="374"/>
+                  </a:lnTo>
+                  <a:lnTo>
+                    <a:pt x="885" y="384"/>
+                  </a:lnTo>
+                  <a:lnTo>
+                    <a:pt x="850" y="396"/>
+                  </a:lnTo>
+                  <a:lnTo>
+                    <a:pt x="815" y="409"/>
+                  </a:lnTo>
+                  <a:lnTo>
+                    <a:pt x="781" y="424"/>
+                  </a:lnTo>
+                  <a:lnTo>
+                    <a:pt x="746" y="439"/>
+                  </a:lnTo>
+                  <a:lnTo>
+                    <a:pt x="711" y="455"/>
+                  </a:lnTo>
+                  <a:lnTo>
+                    <a:pt x="678" y="472"/>
+                  </a:lnTo>
+                  <a:lnTo>
+                    <a:pt x="645" y="490"/>
+                  </a:lnTo>
+                  <a:lnTo>
+                    <a:pt x="612" y="510"/>
+                  </a:lnTo>
+                  <a:lnTo>
+                    <a:pt x="579" y="531"/>
+                  </a:lnTo>
+                  <a:lnTo>
+                    <a:pt x="546" y="554"/>
+                  </a:lnTo>
+                  <a:lnTo>
+                    <a:pt x="515" y="577"/>
+                  </a:lnTo>
+                  <a:lnTo>
+                    <a:pt x="484" y="602"/>
+                  </a:lnTo>
+                  <a:lnTo>
+                    <a:pt x="452" y="629"/>
+                  </a:lnTo>
+                  <a:lnTo>
+                    <a:pt x="421" y="657"/>
+                  </a:lnTo>
+                  <a:lnTo>
+                    <a:pt x="391" y="685"/>
+                  </a:lnTo>
+                  <a:lnTo>
+                    <a:pt x="361" y="716"/>
+                  </a:lnTo>
+                  <a:lnTo>
+                    <a:pt x="333" y="747"/>
+                  </a:lnTo>
+                  <a:lnTo>
+                    <a:pt x="304" y="780"/>
+                  </a:lnTo>
+                  <a:lnTo>
+                    <a:pt x="277" y="815"/>
+                  </a:lnTo>
+                  <a:lnTo>
+                    <a:pt x="249" y="851"/>
+                  </a:lnTo>
+                  <a:lnTo>
+                    <a:pt x="223" y="889"/>
+                  </a:lnTo>
+                  <a:lnTo>
+                    <a:pt x="198" y="929"/>
+                  </a:lnTo>
+                  <a:lnTo>
+                    <a:pt x="172" y="970"/>
+                  </a:lnTo>
+                  <a:lnTo>
+                    <a:pt x="149" y="1012"/>
+                  </a:lnTo>
+                  <a:lnTo>
+                    <a:pt x="124" y="1056"/>
+                  </a:lnTo>
+                  <a:lnTo>
+                    <a:pt x="101" y="1102"/>
+                  </a:lnTo>
+                  <a:lnTo>
+                    <a:pt x="79" y="1150"/>
+                  </a:lnTo>
+                  <a:lnTo>
+                    <a:pt x="58" y="1198"/>
+                  </a:lnTo>
+                  <a:lnTo>
+                    <a:pt x="38" y="1249"/>
+                  </a:lnTo>
+                  <a:lnTo>
+                    <a:pt x="18" y="1302"/>
+                  </a:lnTo>
+                  <a:lnTo>
+                    <a:pt x="0" y="1357"/>
+                  </a:lnTo>
+                  <a:lnTo>
+                    <a:pt x="0" y="118"/>
+                  </a:lnTo>
+                  <a:lnTo>
+                    <a:pt x="0" y="118"/>
+                  </a:lnTo>
+                  <a:close/>
+                </a:path>
+              </a:pathLst>
+            </a:custGeom>
+            <a:solidFill>
+              <a:srgbClr val="B4ECB4"/>
+            </a:solidFill>
+            <a:ln>
+              <a:noFill/>
+            </a:ln>
+          </p:spPr>
+          <p:txBody>
+            <a:bodyPr lIns="91425" tIns="45700" rIns="91425" bIns="45700" anchor="t" anchorCtr="0">
+              <a:noAutofit/>
+            </a:bodyPr>
+            <a:lstStyle/>
+            <a:p>
+              <a:pPr marL="0" marR="0" lvl="0" indent="0" algn="l" rtl="0">
+                <a:spcBef>
+                  <a:spcPts val="0"/>
+                </a:spcBef>
+                <a:buNone/>
+              </a:pPr>
+              <a:endParaRPr sz="1800" b="0" i="0" u="none" strike="noStrike" cap="none" baseline="0">
+                <a:solidFill>
+                  <a:schemeClr val="dk1"/>
+                </a:solidFill>
+                <a:latin typeface="Calibri"/>
+                <a:ea typeface="Calibri"/>
+                <a:cs typeface="Calibri"/>
+                <a:sym typeface="Calibri"/>
+              </a:endParaRPr>
+            </a:p>
+          </p:txBody>
+        </p:sp>
+        <p:sp>
+          <p:nvSpPr>
+            <p:cNvPr id="23" name="Shape 16"/>
+            <p:cNvSpPr/>
+            <p:nvPr/>
+          </p:nvSpPr>
+          <p:spPr>
+            <a:xfrm>
+              <a:off x="1502663" y="5586916"/>
+              <a:ext cx="6519671" cy="5913190"/>
+            </a:xfrm>
+            <a:custGeom>
+              <a:avLst/>
+              <a:gdLst/>
+              <a:ahLst/>
+              <a:cxnLst/>
+              <a:rect l="0" t="0" r="0" b="0"/>
+              <a:pathLst>
+                <a:path w="2552" h="2085" extrusionOk="0">
+                  <a:moveTo>
+                    <a:pt x="1377" y="130"/>
+                  </a:moveTo>
+                  <a:lnTo>
+                    <a:pt x="1377" y="130"/>
+                  </a:lnTo>
+                  <a:lnTo>
+                    <a:pt x="1339" y="109"/>
+                  </a:lnTo>
+                  <a:lnTo>
+                    <a:pt x="1299" y="89"/>
+                  </a:lnTo>
+                  <a:lnTo>
+                    <a:pt x="1260" y="73"/>
+                  </a:lnTo>
+                  <a:lnTo>
+                    <a:pt x="1220" y="56"/>
+                  </a:lnTo>
+                  <a:lnTo>
+                    <a:pt x="1179" y="43"/>
+                  </a:lnTo>
+                  <a:lnTo>
+                    <a:pt x="1137" y="30"/>
+                  </a:lnTo>
+                  <a:lnTo>
+                    <a:pt x="1094" y="20"/>
+                  </a:lnTo>
+                  <a:lnTo>
+                    <a:pt x="1052" y="11"/>
+                  </a:lnTo>
+                  <a:lnTo>
+                    <a:pt x="1009" y="7"/>
+                  </a:lnTo>
+                  <a:lnTo>
+                    <a:pt x="966" y="2"/>
+                  </a:lnTo>
+                  <a:lnTo>
+                    <a:pt x="923" y="0"/>
+                  </a:lnTo>
+                  <a:lnTo>
+                    <a:pt x="880" y="0"/>
+                  </a:lnTo>
+                  <a:lnTo>
+                    <a:pt x="837" y="2"/>
+                  </a:lnTo>
+                  <a:lnTo>
+                    <a:pt x="794" y="5"/>
+                  </a:lnTo>
+                  <a:lnTo>
+                    <a:pt x="751" y="10"/>
+                  </a:lnTo>
+                  <a:lnTo>
+                    <a:pt x="708" y="18"/>
+                  </a:lnTo>
+                  <a:lnTo>
+                    <a:pt x="667" y="28"/>
+                  </a:lnTo>
+                  <a:lnTo>
+                    <a:pt x="624" y="40"/>
+                  </a:lnTo>
+                  <a:lnTo>
+                    <a:pt x="584" y="54"/>
+                  </a:lnTo>
+                  <a:lnTo>
+                    <a:pt x="543" y="69"/>
+                  </a:lnTo>
+                  <a:lnTo>
+                    <a:pt x="504" y="87"/>
+                  </a:lnTo>
+                  <a:lnTo>
+                    <a:pt x="466" y="107"/>
+                  </a:lnTo>
+                  <a:lnTo>
+                    <a:pt x="428" y="130"/>
+                  </a:lnTo>
+                  <a:lnTo>
+                    <a:pt x="391" y="155"/>
+                  </a:lnTo>
+                  <a:lnTo>
+                    <a:pt x="357" y="182"/>
+                  </a:lnTo>
+                  <a:lnTo>
+                    <a:pt x="322" y="210"/>
+                  </a:lnTo>
+                  <a:lnTo>
+                    <a:pt x="289" y="241"/>
+                  </a:lnTo>
+                  <a:lnTo>
+                    <a:pt x="258" y="272"/>
+                  </a:lnTo>
+                  <a:lnTo>
+                    <a:pt x="228" y="309"/>
+                  </a:lnTo>
+                  <a:lnTo>
+                    <a:pt x="200" y="345"/>
+                  </a:lnTo>
+                  <a:lnTo>
+                    <a:pt x="173" y="385"/>
+                  </a:lnTo>
+                  <a:lnTo>
+                    <a:pt x="149" y="426"/>
+                  </a:lnTo>
+                  <a:lnTo>
+                    <a:pt x="149" y="426"/>
+                  </a:lnTo>
+                  <a:lnTo>
+                    <a:pt x="124" y="472"/>
+                  </a:lnTo>
+                  <a:lnTo>
+                    <a:pt x="102" y="520"/>
+                  </a:lnTo>
+                  <a:lnTo>
+                    <a:pt x="83" y="568"/>
+                  </a:lnTo>
+                  <a:lnTo>
+                    <a:pt x="64" y="617"/>
+                  </a:lnTo>
+                  <a:lnTo>
+                    <a:pt x="48" y="667"/>
+                  </a:lnTo>
+                  <a:lnTo>
+                    <a:pt x="35" y="718"/>
+                  </a:lnTo>
+                  <a:lnTo>
+                    <a:pt x="23" y="769"/>
+                  </a:lnTo>
+                  <a:lnTo>
+                    <a:pt x="15" y="822"/>
+                  </a:lnTo>
+                  <a:lnTo>
+                    <a:pt x="7" y="875"/>
+                  </a:lnTo>
+                  <a:lnTo>
+                    <a:pt x="2" y="928"/>
+                  </a:lnTo>
+                  <a:lnTo>
+                    <a:pt x="0" y="982"/>
+                  </a:lnTo>
+                  <a:lnTo>
+                    <a:pt x="0" y="1035"/>
+                  </a:lnTo>
+                  <a:lnTo>
+                    <a:pt x="2" y="1090"/>
+                  </a:lnTo>
+                  <a:lnTo>
+                    <a:pt x="5" y="1146"/>
+                  </a:lnTo>
+                  <a:lnTo>
+                    <a:pt x="12" y="1200"/>
+                  </a:lnTo>
+                  <a:lnTo>
+                    <a:pt x="22" y="1255"/>
+                  </a:lnTo>
+                  <a:lnTo>
+                    <a:pt x="31" y="1311"/>
+                  </a:lnTo>
+                  <a:lnTo>
+                    <a:pt x="46" y="1365"/>
+                  </a:lnTo>
+                  <a:lnTo>
+                    <a:pt x="61" y="1420"/>
+                  </a:lnTo>
+                  <a:lnTo>
+                    <a:pt x="79" y="1474"/>
+                  </a:lnTo>
+                  <a:lnTo>
+                    <a:pt x="101" y="1529"/>
+                  </a:lnTo>
+                  <a:lnTo>
+                    <a:pt x="124" y="1583"/>
+                  </a:lnTo>
+                  <a:lnTo>
+                    <a:pt x="149" y="1636"/>
+                  </a:lnTo>
+                  <a:lnTo>
+                    <a:pt x="177" y="1689"/>
+                  </a:lnTo>
+                  <a:lnTo>
+                    <a:pt x="206" y="1742"/>
+                  </a:lnTo>
+                  <a:lnTo>
+                    <a:pt x="239" y="1793"/>
+                  </a:lnTo>
+                  <a:lnTo>
+                    <a:pt x="274" y="1844"/>
+                  </a:lnTo>
+                  <a:lnTo>
+                    <a:pt x="312" y="1895"/>
+                  </a:lnTo>
+                  <a:lnTo>
+                    <a:pt x="353" y="1943"/>
+                  </a:lnTo>
+                  <a:lnTo>
+                    <a:pt x="396" y="1993"/>
+                  </a:lnTo>
+                  <a:lnTo>
+                    <a:pt x="441" y="2039"/>
+                  </a:lnTo>
+                  <a:lnTo>
+                    <a:pt x="489" y="2085"/>
+                  </a:lnTo>
+                  <a:lnTo>
+                    <a:pt x="2552" y="2085"/>
+                  </a:lnTo>
+                  <a:lnTo>
+                    <a:pt x="2552" y="2085"/>
+                  </a:lnTo>
+                  <a:lnTo>
+                    <a:pt x="2526" y="2070"/>
+                  </a:lnTo>
+                  <a:lnTo>
+                    <a:pt x="2450" y="2026"/>
+                  </a:lnTo>
+                  <a:lnTo>
+                    <a:pt x="2336" y="1955"/>
+                  </a:lnTo>
+                  <a:lnTo>
+                    <a:pt x="2266" y="1910"/>
+                  </a:lnTo>
+                  <a:lnTo>
+                    <a:pt x="2192" y="1860"/>
+                  </a:lnTo>
+                  <a:lnTo>
+                    <a:pt x="2111" y="1808"/>
+                  </a:lnTo>
+                  <a:lnTo>
+                    <a:pt x="2025" y="1748"/>
+                  </a:lnTo>
+                  <a:lnTo>
+                    <a:pt x="1938" y="1685"/>
+                  </a:lnTo>
+                  <a:lnTo>
+                    <a:pt x="1849" y="1619"/>
+                  </a:lnTo>
+                  <a:lnTo>
+                    <a:pt x="1758" y="1550"/>
+                  </a:lnTo>
+                  <a:lnTo>
+                    <a:pt x="1667" y="1477"/>
+                  </a:lnTo>
+                  <a:lnTo>
+                    <a:pt x="1578" y="1403"/>
+                  </a:lnTo>
+                  <a:lnTo>
+                    <a:pt x="1492" y="1326"/>
+                  </a:lnTo>
+                  <a:lnTo>
+                    <a:pt x="1451" y="1286"/>
+                  </a:lnTo>
+                  <a:lnTo>
+                    <a:pt x="1410" y="1246"/>
+                  </a:lnTo>
+                  <a:lnTo>
+                    <a:pt x="1370" y="1207"/>
+                  </a:lnTo>
+                  <a:lnTo>
+                    <a:pt x="1332" y="1167"/>
+                  </a:lnTo>
+                  <a:lnTo>
+                    <a:pt x="1296" y="1126"/>
+                  </a:lnTo>
+                  <a:lnTo>
+                    <a:pt x="1261" y="1086"/>
+                  </a:lnTo>
+                  <a:lnTo>
+                    <a:pt x="1227" y="1045"/>
+                  </a:lnTo>
+                  <a:lnTo>
+                    <a:pt x="1195" y="1004"/>
+                  </a:lnTo>
+                  <a:lnTo>
+                    <a:pt x="1167" y="962"/>
+                  </a:lnTo>
+                  <a:lnTo>
+                    <a:pt x="1139" y="923"/>
+                  </a:lnTo>
+                  <a:lnTo>
+                    <a:pt x="1114" y="881"/>
+                  </a:lnTo>
+                  <a:lnTo>
+                    <a:pt x="1091" y="840"/>
+                  </a:lnTo>
+                  <a:lnTo>
+                    <a:pt x="1071" y="801"/>
+                  </a:lnTo>
+                  <a:lnTo>
+                    <a:pt x="1055" y="761"/>
+                  </a:lnTo>
+                  <a:lnTo>
+                    <a:pt x="1042" y="720"/>
+                  </a:lnTo>
+                  <a:lnTo>
+                    <a:pt x="1030" y="680"/>
+                  </a:lnTo>
+                  <a:lnTo>
+                    <a:pt x="1022" y="642"/>
+                  </a:lnTo>
+                  <a:lnTo>
+                    <a:pt x="1017" y="602"/>
+                  </a:lnTo>
+                  <a:lnTo>
+                    <a:pt x="1015" y="565"/>
+                  </a:lnTo>
+                  <a:lnTo>
+                    <a:pt x="1019" y="527"/>
+                  </a:lnTo>
+                  <a:lnTo>
+                    <a:pt x="1023" y="489"/>
+                  </a:lnTo>
+                  <a:lnTo>
+                    <a:pt x="1028" y="470"/>
+                  </a:lnTo>
+                  <a:lnTo>
+                    <a:pt x="1033" y="452"/>
+                  </a:lnTo>
+                  <a:lnTo>
+                    <a:pt x="1040" y="434"/>
+                  </a:lnTo>
+                  <a:lnTo>
+                    <a:pt x="1048" y="416"/>
+                  </a:lnTo>
+                  <a:lnTo>
+                    <a:pt x="1057" y="398"/>
+                  </a:lnTo>
+                  <a:lnTo>
+                    <a:pt x="1066" y="381"/>
+                  </a:lnTo>
+                  <a:lnTo>
+                    <a:pt x="1076" y="363"/>
+                  </a:lnTo>
+                  <a:lnTo>
+                    <a:pt x="1088" y="347"/>
+                  </a:lnTo>
+                  <a:lnTo>
+                    <a:pt x="1101" y="330"/>
+                  </a:lnTo>
+                  <a:lnTo>
+                    <a:pt x="1116" y="312"/>
+                  </a:lnTo>
+                  <a:lnTo>
+                    <a:pt x="1131" y="295"/>
+                  </a:lnTo>
+                  <a:lnTo>
+                    <a:pt x="1147" y="281"/>
+                  </a:lnTo>
+                  <a:lnTo>
+                    <a:pt x="1182" y="248"/>
+                  </a:lnTo>
+                  <a:lnTo>
+                    <a:pt x="1223" y="216"/>
+                  </a:lnTo>
+                  <a:lnTo>
+                    <a:pt x="1269" y="186"/>
+                  </a:lnTo>
+                  <a:lnTo>
+                    <a:pt x="1321" y="158"/>
+                  </a:lnTo>
+                  <a:lnTo>
+                    <a:pt x="1377" y="130"/>
+                  </a:lnTo>
+                  <a:lnTo>
+                    <a:pt x="1377" y="130"/>
+                  </a:lnTo>
+                  <a:close/>
+                </a:path>
+              </a:pathLst>
+            </a:custGeom>
+            <a:solidFill>
+              <a:srgbClr val="F2F2F2">
+                <a:alpha val="33725"/>
+              </a:srgbClr>
+            </a:solidFill>
+            <a:ln>
+              <a:noFill/>
+            </a:ln>
+          </p:spPr>
+          <p:txBody>
+            <a:bodyPr lIns="91425" tIns="45700" rIns="91425" bIns="45700" anchor="t" anchorCtr="0">
+              <a:noAutofit/>
+            </a:bodyPr>
+            <a:lstStyle/>
+            <a:p>
+              <a:pPr marL="0" marR="0" lvl="0" indent="0" algn="l" rtl="0">
+                <a:spcBef>
+                  <a:spcPts val="0"/>
+                </a:spcBef>
+                <a:buNone/>
+              </a:pPr>
+              <a:endParaRPr sz="1800" b="0" i="0" u="none" strike="noStrike" cap="none" baseline="0">
+                <a:solidFill>
+                  <a:schemeClr val="dk1"/>
+                </a:solidFill>
+                <a:latin typeface="Calibri"/>
+                <a:ea typeface="Calibri"/>
+                <a:cs typeface="Calibri"/>
+                <a:sym typeface="Calibri"/>
+              </a:endParaRPr>
+            </a:p>
+          </p:txBody>
+        </p:sp>
+        <p:sp>
+          <p:nvSpPr>
+            <p:cNvPr id="24" name="Shape 17"/>
+            <p:cNvSpPr/>
+            <p:nvPr/>
+          </p:nvSpPr>
+          <p:spPr>
+            <a:xfrm>
+              <a:off x="1155001" y="5801712"/>
+              <a:ext cx="3420932" cy="5698393"/>
+            </a:xfrm>
+            <a:custGeom>
+              <a:avLst/>
+              <a:gdLst/>
+              <a:ahLst/>
+              <a:cxnLst/>
+              <a:rect l="0" t="0" r="0" b="0"/>
+              <a:pathLst>
+                <a:path w="718" h="1804" extrusionOk="0">
+                  <a:moveTo>
+                    <a:pt x="99" y="1804"/>
+                  </a:moveTo>
+                  <a:lnTo>
+                    <a:pt x="99" y="1804"/>
+                  </a:lnTo>
+                  <a:lnTo>
+                    <a:pt x="77" y="1725"/>
+                  </a:lnTo>
+                  <a:lnTo>
+                    <a:pt x="57" y="1647"/>
+                  </a:lnTo>
+                  <a:lnTo>
+                    <a:pt x="43" y="1570"/>
+                  </a:lnTo>
+                  <a:lnTo>
+                    <a:pt x="29" y="1492"/>
+                  </a:lnTo>
+                  <a:lnTo>
+                    <a:pt x="18" y="1416"/>
+                  </a:lnTo>
+                  <a:lnTo>
+                    <a:pt x="10" y="1342"/>
+                  </a:lnTo>
+                  <a:lnTo>
+                    <a:pt x="5" y="1267"/>
+                  </a:lnTo>
+                  <a:lnTo>
+                    <a:pt x="1" y="1195"/>
+                  </a:lnTo>
+                  <a:lnTo>
+                    <a:pt x="0" y="1124"/>
+                  </a:lnTo>
+                  <a:lnTo>
+                    <a:pt x="1" y="1054"/>
+                  </a:lnTo>
+                  <a:lnTo>
+                    <a:pt x="5" y="987"/>
+                  </a:lnTo>
+                  <a:lnTo>
+                    <a:pt x="10" y="919"/>
+                  </a:lnTo>
+                  <a:lnTo>
+                    <a:pt x="18" y="853"/>
+                  </a:lnTo>
+                  <a:lnTo>
+                    <a:pt x="26" y="790"/>
+                  </a:lnTo>
+                  <a:lnTo>
+                    <a:pt x="38" y="728"/>
+                  </a:lnTo>
+                  <a:lnTo>
+                    <a:pt x="49" y="667"/>
+                  </a:lnTo>
+                  <a:lnTo>
+                    <a:pt x="64" y="609"/>
+                  </a:lnTo>
+                  <a:lnTo>
+                    <a:pt x="81" y="553"/>
+                  </a:lnTo>
+                  <a:lnTo>
+                    <a:pt x="97" y="496"/>
+                  </a:lnTo>
+                  <a:lnTo>
+                    <a:pt x="117" y="445"/>
+                  </a:lnTo>
+                  <a:lnTo>
+                    <a:pt x="137" y="394"/>
+                  </a:lnTo>
+                  <a:lnTo>
+                    <a:pt x="158" y="346"/>
+                  </a:lnTo>
+                  <a:lnTo>
+                    <a:pt x="180" y="300"/>
+                  </a:lnTo>
+                  <a:lnTo>
+                    <a:pt x="203" y="255"/>
+                  </a:lnTo>
+                  <a:lnTo>
+                    <a:pt x="227" y="214"/>
+                  </a:lnTo>
+                  <a:lnTo>
+                    <a:pt x="254" y="176"/>
+                  </a:lnTo>
+                  <a:lnTo>
+                    <a:pt x="280" y="140"/>
+                  </a:lnTo>
+                  <a:lnTo>
+                    <a:pt x="307" y="105"/>
+                  </a:lnTo>
+                  <a:lnTo>
+                    <a:pt x="335" y="76"/>
+                  </a:lnTo>
+                  <a:lnTo>
+                    <a:pt x="363" y="47"/>
+                  </a:lnTo>
+                  <a:lnTo>
+                    <a:pt x="391" y="21"/>
+                  </a:lnTo>
+                  <a:lnTo>
+                    <a:pt x="421" y="0"/>
+                  </a:lnTo>
+                  <a:lnTo>
+                    <a:pt x="421" y="0"/>
+                  </a:lnTo>
+                  <a:lnTo>
+                    <a:pt x="383" y="57"/>
+                  </a:lnTo>
+                  <a:lnTo>
+                    <a:pt x="348" y="117"/>
+                  </a:lnTo>
+                  <a:lnTo>
+                    <a:pt x="317" y="176"/>
+                  </a:lnTo>
+                  <a:lnTo>
+                    <a:pt x="289" y="237"/>
+                  </a:lnTo>
+                  <a:lnTo>
+                    <a:pt x="265" y="298"/>
+                  </a:lnTo>
+                  <a:lnTo>
+                    <a:pt x="244" y="359"/>
+                  </a:lnTo>
+                  <a:lnTo>
+                    <a:pt x="226" y="421"/>
+                  </a:lnTo>
+                  <a:lnTo>
+                    <a:pt x="213" y="482"/>
+                  </a:lnTo>
+                  <a:lnTo>
+                    <a:pt x="201" y="544"/>
+                  </a:lnTo>
+                  <a:lnTo>
+                    <a:pt x="193" y="605"/>
+                  </a:lnTo>
+                  <a:lnTo>
+                    <a:pt x="188" y="667"/>
+                  </a:lnTo>
+                  <a:lnTo>
+                    <a:pt x="185" y="728"/>
+                  </a:lnTo>
+                  <a:lnTo>
+                    <a:pt x="186" y="789"/>
+                  </a:lnTo>
+                  <a:lnTo>
+                    <a:pt x="189" y="850"/>
+                  </a:lnTo>
+                  <a:lnTo>
+                    <a:pt x="196" y="911"/>
+                  </a:lnTo>
+                  <a:lnTo>
+                    <a:pt x="206" y="970"/>
+                  </a:lnTo>
+                  <a:lnTo>
+                    <a:pt x="219" y="1030"/>
+                  </a:lnTo>
+                  <a:lnTo>
+                    <a:pt x="234" y="1089"/>
+                  </a:lnTo>
+                  <a:lnTo>
+                    <a:pt x="252" y="1147"/>
+                  </a:lnTo>
+                  <a:lnTo>
+                    <a:pt x="274" y="1205"/>
+                  </a:lnTo>
+                  <a:lnTo>
+                    <a:pt x="297" y="1261"/>
+                  </a:lnTo>
+                  <a:lnTo>
+                    <a:pt x="323" y="1317"/>
+                  </a:lnTo>
+                  <a:lnTo>
+                    <a:pt x="351" y="1371"/>
+                  </a:lnTo>
+                  <a:lnTo>
+                    <a:pt x="383" y="1424"/>
+                  </a:lnTo>
+                  <a:lnTo>
+                    <a:pt x="416" y="1477"/>
+                  </a:lnTo>
+                  <a:lnTo>
+                    <a:pt x="452" y="1528"/>
+                  </a:lnTo>
+                  <a:lnTo>
+                    <a:pt x="492" y="1578"/>
+                  </a:lnTo>
+                  <a:lnTo>
+                    <a:pt x="531" y="1626"/>
+                  </a:lnTo>
+                  <a:lnTo>
+                    <a:pt x="576" y="1674"/>
+                  </a:lnTo>
+                  <a:lnTo>
+                    <a:pt x="620" y="1718"/>
+                  </a:lnTo>
+                  <a:lnTo>
+                    <a:pt x="668" y="1763"/>
+                  </a:lnTo>
+                  <a:lnTo>
+                    <a:pt x="718" y="1804"/>
+                  </a:lnTo>
+                  <a:lnTo>
+                    <a:pt x="99" y="1804"/>
+                  </a:lnTo>
+                  <a:lnTo>
+                    <a:pt x="99" y="1804"/>
+                  </a:lnTo>
+                  <a:close/>
+                </a:path>
+              </a:pathLst>
+            </a:custGeom>
+            <a:solidFill>
+              <a:srgbClr val="8FE38F">
+                <a:alpha val="36862"/>
+              </a:srgbClr>
+            </a:solidFill>
+            <a:ln>
+              <a:noFill/>
+            </a:ln>
+          </p:spPr>
+          <p:txBody>
+            <a:bodyPr lIns="91425" tIns="45700" rIns="91425" bIns="45700" anchor="t" anchorCtr="0">
+              <a:noAutofit/>
+            </a:bodyPr>
+            <a:lstStyle/>
+            <a:p>
+              <a:pPr marL="0" marR="0" lvl="0" indent="0" algn="l" rtl="0">
+                <a:spcBef>
+                  <a:spcPts val="0"/>
+                </a:spcBef>
+                <a:buNone/>
+              </a:pPr>
+              <a:endParaRPr sz="1800" b="0" i="0" u="none" strike="noStrike" cap="none" baseline="0">
+                <a:solidFill>
+                  <a:schemeClr val="dk1"/>
+                </a:solidFill>
+                <a:latin typeface="Calibri"/>
+                <a:ea typeface="Calibri"/>
+                <a:cs typeface="Calibri"/>
+                <a:sym typeface="Calibri"/>
+              </a:endParaRPr>
+            </a:p>
+          </p:txBody>
+        </p:sp>
+      </p:grpSp>
       <p:sp>
         <p:nvSpPr>
           <p:cNvPr id="2" name="タイトル プレースホルダ 1"/>
@@ -20450,10 +22472,18 @@
           <a:lstStyle/>
           <a:p>
             <a:r>
-              <a:rPr kumimoji="1" lang="ja-JP" altLang="en-US" smtClean="0"/>
-              <a:t>マスタ タイトルの書式設定</a:t>
-            </a:r>
-            <a:endParaRPr kumimoji="1" lang="ja-JP" altLang="en-US"/>
+              <a:rPr kumimoji="1" lang="ja-JP" altLang="en-US" dirty="0" smtClean="0"/>
+              <a:t>マスタ </a:t>
+            </a:r>
+            <a:r>
+              <a:rPr kumimoji="1" lang="ja-JP" altLang="en-US" dirty="0" smtClean="0"/>
+              <a:t>タイトル</a:t>
+            </a:r>
+            <a:r>
+              <a:rPr kumimoji="1" lang="ja-JP" altLang="en-US" dirty="0" smtClean="0"/>
+              <a:t>の書式設定</a:t>
+            </a:r>
+            <a:endParaRPr kumimoji="1" lang="ja-JP" altLang="en-US" dirty="0"/>
           </a:p>
         </p:txBody>
       </p:sp>
@@ -20484,70 +22514,70 @@
           <a:p>
             <a:pPr lvl="0"/>
             <a:r>
-              <a:rPr kumimoji="1" lang="ja-JP" altLang="en-US" smtClean="0"/>
+              <a:rPr kumimoji="1" lang="ja-JP" altLang="en-US" dirty="0" smtClean="0"/>
               <a:t>マスタ テキストの書式設定</a:t>
             </a:r>
           </a:p>
           <a:p>
             <a:pPr lvl="1"/>
             <a:r>
-              <a:rPr kumimoji="1" lang="ja-JP" altLang="en-US" smtClean="0"/>
+              <a:rPr kumimoji="1" lang="ja-JP" altLang="en-US" dirty="0" smtClean="0"/>
               <a:t>第 </a:t>
             </a:r>
             <a:r>
-              <a:rPr kumimoji="1" lang="en-US" altLang="ja-JP" smtClean="0"/>
+              <a:rPr kumimoji="1" lang="en-US" altLang="ja-JP" dirty="0" smtClean="0"/>
               <a:t>2 </a:t>
             </a:r>
             <a:r>
-              <a:rPr kumimoji="1" lang="ja-JP" altLang="en-US" smtClean="0"/>
+              <a:rPr kumimoji="1" lang="ja-JP" altLang="en-US" dirty="0" smtClean="0"/>
               <a:t>レベル</a:t>
             </a:r>
           </a:p>
           <a:p>
             <a:pPr lvl="2"/>
             <a:r>
-              <a:rPr kumimoji="1" lang="ja-JP" altLang="en-US" smtClean="0"/>
+              <a:rPr kumimoji="1" lang="ja-JP" altLang="en-US" dirty="0" smtClean="0"/>
               <a:t>第 </a:t>
             </a:r>
             <a:r>
-              <a:rPr kumimoji="1" lang="en-US" altLang="ja-JP" smtClean="0"/>
+              <a:rPr kumimoji="1" lang="en-US" altLang="ja-JP" dirty="0" smtClean="0"/>
               <a:t>3 </a:t>
             </a:r>
             <a:r>
-              <a:rPr kumimoji="1" lang="ja-JP" altLang="en-US" smtClean="0"/>
+              <a:rPr kumimoji="1" lang="ja-JP" altLang="en-US" dirty="0" smtClean="0"/>
               <a:t>レベル</a:t>
             </a:r>
           </a:p>
           <a:p>
             <a:pPr lvl="3"/>
             <a:r>
-              <a:rPr kumimoji="1" lang="ja-JP" altLang="en-US" smtClean="0"/>
+              <a:rPr kumimoji="1" lang="ja-JP" altLang="en-US" dirty="0" smtClean="0"/>
               <a:t>第 </a:t>
             </a:r>
             <a:r>
-              <a:rPr kumimoji="1" lang="en-US" altLang="ja-JP" smtClean="0"/>
+              <a:rPr kumimoji="1" lang="en-US" altLang="ja-JP" dirty="0" smtClean="0"/>
               <a:t>4 </a:t>
             </a:r>
             <a:r>
-              <a:rPr kumimoji="1" lang="ja-JP" altLang="en-US" smtClean="0"/>
+              <a:rPr kumimoji="1" lang="ja-JP" altLang="en-US" dirty="0" smtClean="0"/>
               <a:t>レベル</a:t>
             </a:r>
           </a:p>
           <a:p>
             <a:pPr lvl="4"/>
             <a:r>
-              <a:rPr kumimoji="1" lang="ja-JP" altLang="en-US" smtClean="0"/>
+              <a:rPr kumimoji="1" lang="ja-JP" altLang="en-US" dirty="0" smtClean="0"/>
               <a:t>第 </a:t>
             </a:r>
             <a:r>
-              <a:rPr kumimoji="1" lang="en-US" altLang="ja-JP" smtClean="0"/>
+              <a:rPr kumimoji="1" lang="en-US" altLang="ja-JP" dirty="0" smtClean="0"/>
               <a:t>5 </a:t>
             </a:r>
             <a:r>
-              <a:rPr kumimoji="1" lang="ja-JP" altLang="en-US" smtClean="0"/>
+              <a:rPr kumimoji="1" lang="ja-JP" altLang="en-US" dirty="0" smtClean="0"/>
               <a:t>レベル</a:t>
             </a:r>
-            <a:endParaRPr kumimoji="1" lang="ja-JP" altLang="en-US"/>
+            <a:endParaRPr kumimoji="1" lang="ja-JP" altLang="en-US" dirty="0"/>
           </a:p>
         </p:txBody>
       </p:sp>
@@ -20970,7 +23000,7 @@
         </p:nvSpPr>
         <p:spPr>
           <a:xfrm>
-            <a:off x="251520" y="2130425"/>
+            <a:off x="251520" y="1382911"/>
             <a:ext cx="8712968" cy="1470025"/>
           </a:xfrm>
         </p:spPr>
@@ -20997,7 +23027,19 @@
             </a:br>
             <a:r>
               <a:rPr lang="ja-JP" altLang="en-US" dirty="0" smtClean="0"/>
-              <a:t>機能提案および評価</a:t>
+              <a:t>機能</a:t>
+            </a:r>
+            <a:r>
+              <a:rPr lang="ja-JP" altLang="en-US" dirty="0" smtClean="0"/>
+              <a:t>提案</a:t>
+            </a:r>
+            <a:r>
+              <a:rPr lang="ja-JP" altLang="en-US" dirty="0" smtClean="0"/>
+              <a:t>及び、</a:t>
+            </a:r>
+            <a:r>
+              <a:rPr lang="ja-JP" altLang="en-US" dirty="0" smtClean="0"/>
+              <a:t>評価</a:t>
             </a:r>
             <a:endParaRPr kumimoji="1" lang="ja-JP" altLang="en-US" dirty="0"/>
           </a:p>
@@ -21015,44 +23057,78 @@
         </p:nvSpPr>
         <p:spPr>
           <a:xfrm>
-            <a:off x="2483768" y="4869160"/>
-            <a:ext cx="6400800" cy="1752600"/>
+            <a:off x="979512" y="4941168"/>
+            <a:ext cx="7768952" cy="1752600"/>
           </a:xfrm>
         </p:spPr>
         <p:txBody>
-          <a:bodyPr/>
+          <a:bodyPr>
+            <a:normAutofit lnSpcReduction="10000"/>
+          </a:bodyPr>
           <a:lstStyle/>
           <a:p>
             <a:pPr algn="r"/>
             <a:r>
-              <a:rPr kumimoji="1" lang="ja-JP" altLang="en-US" dirty="0" smtClean="0"/>
+              <a:rPr kumimoji="1" lang="ja-JP" altLang="en-US" sz="2400" dirty="0" smtClean="0"/>
               <a:t>国立情報学研究所</a:t>
             </a:r>
             <a:r>
-              <a:rPr lang="ja-JP" altLang="en-US" dirty="0" smtClean="0"/>
+              <a:rPr lang="ja-JP" altLang="en-US" sz="2400" dirty="0" smtClean="0"/>
               <a:t>　</a:t>
             </a:r>
             <a:r>
-              <a:rPr kumimoji="1" lang="ja-JP" altLang="en-US" dirty="0" smtClean="0"/>
-              <a:t>新井研究室</a:t>
-            </a:r>
-            <a:endParaRPr kumimoji="1" lang="en-US" altLang="ja-JP" dirty="0" smtClean="0"/>
+              <a:rPr lang="ja-JP" altLang="en-US" sz="2400" dirty="0" smtClean="0"/>
+              <a:t>社会共有知研究センタ</a:t>
+            </a:r>
+            <a:endParaRPr lang="en-US" altLang="ja-JP" sz="2400" dirty="0" smtClean="0"/>
           </a:p>
           <a:p>
             <a:pPr algn="r"/>
             <a:r>
-              <a:rPr lang="ja-JP" altLang="en-US" dirty="0" smtClean="0"/>
-              <a:t>日立製作所（情公共）（消防セ１）</a:t>
-            </a:r>
-            <a:endParaRPr kumimoji="1" lang="en-US" altLang="ja-JP" dirty="0" smtClean="0"/>
+              <a:rPr kumimoji="1" lang="ja-JP" altLang="en-US" sz="2400" dirty="0" smtClean="0"/>
+              <a:t>新井</a:t>
+            </a:r>
+            <a:r>
+              <a:rPr kumimoji="1" lang="ja-JP" altLang="en-US" sz="2400" dirty="0" smtClean="0"/>
+              <a:t>研究室</a:t>
+            </a:r>
+            <a:endParaRPr kumimoji="1" lang="en-US" altLang="ja-JP" sz="2400" dirty="0" smtClean="0"/>
           </a:p>
           <a:p>
             <a:pPr algn="r"/>
             <a:r>
-              <a:rPr kumimoji="1" lang="ja-JP" altLang="en-US" dirty="0" smtClean="0"/>
-              <a:t>外田浩太朗</a:t>
-            </a:r>
-            <a:endParaRPr kumimoji="1" lang="ja-JP" altLang="en-US" dirty="0"/>
+              <a:rPr lang="ja-JP" altLang="en-US" sz="2400" dirty="0" smtClean="0"/>
+              <a:t>日立</a:t>
+            </a:r>
+            <a:r>
+              <a:rPr lang="ja-JP" altLang="en-US" sz="2400" dirty="0" smtClean="0"/>
+              <a:t>製作所　（</a:t>
+            </a:r>
+            <a:r>
+              <a:rPr lang="ja-JP" altLang="en-US" sz="2400" dirty="0" smtClean="0"/>
+              <a:t>情公共</a:t>
+            </a:r>
+            <a:r>
+              <a:rPr lang="ja-JP" altLang="en-US" sz="2400" dirty="0" smtClean="0"/>
+              <a:t>）　（</a:t>
+            </a:r>
+            <a:r>
+              <a:rPr lang="ja-JP" altLang="en-US" sz="2400" dirty="0" smtClean="0"/>
+              <a:t>消防セ１）</a:t>
+            </a:r>
+            <a:endParaRPr kumimoji="1" lang="en-US" altLang="ja-JP" sz="2400" dirty="0" smtClean="0"/>
+          </a:p>
+          <a:p>
+            <a:pPr algn="r"/>
+            <a:r>
+              <a:rPr kumimoji="1" lang="ja-JP" altLang="en-US" sz="2400" dirty="0" smtClean="0"/>
+              <a:t>外</a:t>
+            </a:r>
+            <a:r>
+              <a:rPr kumimoji="1" lang="ja-JP" altLang="en-US" sz="2400" dirty="0" smtClean="0"/>
+              <a:t>田浩太朗</a:t>
+            </a:r>
+            <a:endParaRPr kumimoji="1" lang="ja-JP" altLang="en-US" sz="2400" dirty="0"/>
           </a:p>
         </p:txBody>
       </p:sp>
@@ -25802,18 +27878,7 @@
                 <a:ea typeface="ＭＳ Ｐゴシック" pitchFamily="50" charset="-128"/>
                 <a:cs typeface="ＭＳ Ｐゴシック" pitchFamily="50" charset="-128"/>
               </a:rPr>
-              <a:t>&lt;!– </a:t>
-            </a:r>
-            <a:r>
-              <a:rPr lang="en-US" altLang="ja-JP" sz="1200" b="1" dirty="0" smtClean="0">
-                <a:solidFill>
-                  <a:srgbClr val="26AB1F"/>
-                </a:solidFill>
-                <a:latin typeface="Arial" pitchFamily="34" charset="0"/>
-                <a:ea typeface="ＭＳ Ｐゴシック" pitchFamily="50" charset="-128"/>
-                <a:cs typeface="ＭＳ Ｐゴシック" pitchFamily="50" charset="-128"/>
-              </a:rPr>
-              <a:t>CakePHP</a:t>
+              <a:t>&lt;!– CakePHP</a:t>
             </a:r>
             <a:r>
               <a:rPr lang="ja-JP" altLang="en-US" sz="1200" b="1" dirty="0" smtClean="0">
@@ -25824,29 +27889,7 @@
                 <a:ea typeface="ＭＳ Ｐゴシック" pitchFamily="50" charset="-128"/>
                 <a:cs typeface="ＭＳ Ｐゴシック" pitchFamily="50" charset="-128"/>
               </a:rPr>
-              <a:t>の</a:t>
-            </a:r>
-            <a:r>
-              <a:rPr lang="ja-JP" altLang="en-US" sz="1200" b="1" dirty="0" smtClean="0">
-                <a:solidFill>
-                  <a:srgbClr val="26AB1F"/>
-                </a:solidFill>
-                <a:latin typeface="Arial" pitchFamily="34" charset="0"/>
-                <a:ea typeface="ＭＳ Ｐゴシック" pitchFamily="50" charset="-128"/>
-                <a:cs typeface="ＭＳ Ｐゴシック" pitchFamily="50" charset="-128"/>
-              </a:rPr>
-              <a:t>ビ</a:t>
-            </a:r>
-            <a:r>
-              <a:rPr lang="ja-JP" altLang="en-US" sz="1200" b="1" dirty="0" smtClean="0">
-                <a:solidFill>
-                  <a:srgbClr val="26AB1F"/>
-                </a:solidFill>
-                <a:latin typeface="Arial" pitchFamily="34" charset="0"/>
-                <a:ea typeface="ＭＳ Ｐゴシック" pitchFamily="50" charset="-128"/>
-                <a:cs typeface="ＭＳ Ｐゴシック" pitchFamily="50" charset="-128"/>
-              </a:rPr>
-              <a:t>ューファイル</a:t>
+              <a:t>のビューファイル</a:t>
             </a:r>
             <a:r>
               <a:rPr lang="en-US" altLang="ja-JP" sz="1200" b="1" dirty="0" smtClean="0">
@@ -28638,11 +30681,7 @@
           <a:p>
             <a:r>
               <a:rPr lang="ja-JP" altLang="en-US" sz="1400" dirty="0" smtClean="0"/>
-              <a:t>は</a:t>
-            </a:r>
-            <a:r>
-              <a:rPr lang="ja-JP" altLang="en-US" sz="1400" dirty="0" smtClean="0"/>
-              <a:t>インフラ系ソフトウェア</a:t>
+              <a:t>はインフラ系ソフトウェア</a:t>
             </a:r>
             <a:endParaRPr kumimoji="1" lang="ja-JP" altLang="en-US" sz="1400" dirty="0"/>
           </a:p>

</xml_diff>